<commit_message>
updated slides as per Mitch's suggestions
</commit_message>
<xml_diff>
--- a/Slides/Module 06.2 Agile Planning and Estimation.pptx
+++ b/Slides/Module 06.2 Agile Planning and Estimation.pptx
@@ -267,7 +267,7 @@
           <a:p>
             <a:fld id="{7C7E5181-6CF5-45F7-A87A-E0E0B1FD7549}" type="datetimeFigureOut">
               <a:rPr lang="en-US" smtClean="0"/>
-              <a:t>9/12/2023</a:t>
+              <a:t>9/19/2023</a:t>
             </a:fld>
             <a:endParaRPr lang="en-US"/>
           </a:p>
@@ -3503,7 +3503,7 @@
           <a:p>
             <a:fld id="{5D2A64DE-480B-420F-9649-4F8E696E08E0}" type="datetime1">
               <a:rPr lang="en-US" smtClean="0"/>
-              <a:t>9/12/2023</a:t>
+              <a:t>9/19/2023</a:t>
             </a:fld>
             <a:endParaRPr lang="en-US"/>
           </a:p>
@@ -3827,7 +3827,7 @@
           <a:p>
             <a:fld id="{EA476A42-A091-4468-A075-64A31BE59948}" type="datetime1">
               <a:rPr lang="en-US" smtClean="0"/>
-              <a:t>9/12/2023</a:t>
+              <a:t>9/19/2023</a:t>
             </a:fld>
             <a:endParaRPr lang="en-US"/>
           </a:p>
@@ -4025,7 +4025,7 @@
           <a:p>
             <a:fld id="{0D3616D0-8311-4107-9726-6B805E7D05BA}" type="datetime1">
               <a:rPr lang="en-US" smtClean="0"/>
-              <a:t>9/12/2023</a:t>
+              <a:t>9/19/2023</a:t>
             </a:fld>
             <a:endParaRPr lang="en-US"/>
           </a:p>
@@ -4233,7 +4233,7 @@
           <a:p>
             <a:fld id="{3BC2557A-5C88-417A-A763-5AC779462A5F}" type="datetime1">
               <a:rPr lang="en-US" smtClean="0"/>
-              <a:t>9/12/2023</a:t>
+              <a:t>9/19/2023</a:t>
             </a:fld>
             <a:endParaRPr lang="en-US"/>
           </a:p>
@@ -4757,7 +4757,7 @@
           <a:p>
             <a:fld id="{07C7BFD4-467E-4EDE-93EA-052F5B39A4E5}" type="datetime1">
               <a:rPr lang="en-US" smtClean="0"/>
-              <a:t>9/12/2023</a:t>
+              <a:t>9/19/2023</a:t>
             </a:fld>
             <a:endParaRPr lang="en-US"/>
           </a:p>
@@ -5007,7 +5007,7 @@
           <a:p>
             <a:fld id="{07C7BFD4-467E-4EDE-93EA-052F5B39A4E5}" type="datetime1">
               <a:rPr lang="en-US" smtClean="0"/>
-              <a:t>9/12/2023</a:t>
+              <a:t>9/19/2023</a:t>
             </a:fld>
             <a:endParaRPr lang="en-US"/>
           </a:p>
@@ -5189,7 +5189,7 @@
           <a:p>
             <a:fld id="{109E55A0-C911-4F03-82FC-7E5926047D46}" type="datetime1">
               <a:rPr lang="en-US" smtClean="0"/>
-              <a:t>9/12/2023</a:t>
+              <a:t>9/19/2023</a:t>
             </a:fld>
             <a:endParaRPr lang="en-US"/>
           </a:p>
@@ -5502,7 +5502,7 @@
           <a:p>
             <a:fld id="{A533CBE2-D5BE-47AC-ADC2-9CDFC1D0CF90}" type="datetime1">
               <a:rPr lang="en-US" smtClean="0"/>
-              <a:t>9/12/2023</a:t>
+              <a:t>9/19/2023</a:t>
             </a:fld>
             <a:endParaRPr lang="en-US"/>
           </a:p>
@@ -5803,7 +5803,7 @@
           <a:p>
             <a:fld id="{39B7EDB1-CE74-4951-85A2-0B01C2128E28}" type="datetime1">
               <a:rPr lang="en-US" smtClean="0"/>
-              <a:t>9/12/2023</a:t>
+              <a:t>9/19/2023</a:t>
             </a:fld>
             <a:endParaRPr lang="en-US"/>
           </a:p>
@@ -6251,7 +6251,7 @@
           <a:p>
             <a:fld id="{2BC7EB92-A5C2-4807-A9DC-9EDE6CBFB241}" type="datetime1">
               <a:rPr lang="en-US" smtClean="0"/>
-              <a:t>9/12/2023</a:t>
+              <a:t>9/19/2023</a:t>
             </a:fld>
             <a:endParaRPr lang="en-US"/>
           </a:p>
@@ -6364,7 +6364,7 @@
           <a:p>
             <a:fld id="{2B7B7EE0-7771-4CD5-9B2B-3550753A54A1}" type="datetime1">
               <a:rPr lang="en-US" smtClean="0"/>
-              <a:t>9/12/2023</a:t>
+              <a:t>9/19/2023</a:t>
             </a:fld>
             <a:endParaRPr lang="en-US"/>
           </a:p>
@@ -6675,7 +6675,7 @@
           <a:p>
             <a:fld id="{F8B318B3-0E87-4416-A9B8-D891968C2727}" type="datetime1">
               <a:rPr lang="en-US" smtClean="0"/>
-              <a:t>9/12/2023</a:t>
+              <a:t>9/19/2023</a:t>
             </a:fld>
             <a:endParaRPr lang="en-US"/>
           </a:p>
@@ -6916,7 +6916,7 @@
           <a:p>
             <a:fld id="{54D997E8-DDEE-43F1-8D9B-F8A1E11DE488}" type="datetime1">
               <a:rPr lang="en-US" smtClean="0"/>
-              <a:t>9/12/2023</a:t>
+              <a:t>9/19/2023</a:t>
             </a:fld>
             <a:endParaRPr lang="en-US"/>
           </a:p>
@@ -8302,63 +8302,6 @@
           <a:chExt cx="0" cy="0"/>
         </a:xfrm>
       </p:grpSpPr>
-      <p:sp>
-        <p:nvSpPr>
-          <p:cNvPr id="2" name="Title 1">
-            <a:extLst>
-              <a:ext uri="{FF2B5EF4-FFF2-40B4-BE49-F238E27FC236}">
-                <a16:creationId xmlns:a16="http://schemas.microsoft.com/office/drawing/2014/main" id="{CFC36F48-BA69-AA48-BC70-F918E07B19CD}"/>
-              </a:ext>
-            </a:extLst>
-          </p:cNvPr>
-          <p:cNvSpPr>
-            <a:spLocks noGrp="1"/>
-          </p:cNvSpPr>
-          <p:nvPr>
-            <p:ph type="title"/>
-          </p:nvPr>
-        </p:nvSpPr>
-        <p:spPr/>
-        <p:txBody>
-          <a:bodyPr/>
-          <a:lstStyle/>
-          <a:p>
-            <a:r>
-              <a:rPr lang="en-US" dirty="0"/>
-              <a:t>Example: Estimating with T-Shirt Sizes</a:t>
-            </a:r>
-          </a:p>
-        </p:txBody>
-      </p:sp>
-      <p:sp>
-        <p:nvSpPr>
-          <p:cNvPr id="4" name="Slide Number Placeholder 3">
-            <a:extLst>
-              <a:ext uri="{FF2B5EF4-FFF2-40B4-BE49-F238E27FC236}">
-                <a16:creationId xmlns:a16="http://schemas.microsoft.com/office/drawing/2014/main" id="{8732857F-B530-074E-9ACC-2F02DB3465D7}"/>
-              </a:ext>
-            </a:extLst>
-          </p:cNvPr>
-          <p:cNvSpPr>
-            <a:spLocks noGrp="1"/>
-          </p:cNvSpPr>
-          <p:nvPr>
-            <p:ph type="sldNum" sz="quarter" idx="12"/>
-          </p:nvPr>
-        </p:nvSpPr>
-        <p:spPr/>
-        <p:txBody>
-          <a:bodyPr/>
-          <a:lstStyle/>
-          <a:p>
-            <a:fld id="{20F37917-FD3A-4669-9018-DA04BCDD3D75}" type="slidenum">
-              <a:rPr lang="en-US" smtClean="0"/>
-              <a:t>13</a:t>
-            </a:fld>
-            <a:endParaRPr lang="en-US"/>
-          </a:p>
-        </p:txBody>
-      </p:sp>
       <p:graphicFrame>
         <p:nvGraphicFramePr>
           <p:cNvPr id="5" name="Table 5">
@@ -8762,6 +8705,63 @@
       </p:graphicFrame>
       <p:sp>
         <p:nvSpPr>
+          <p:cNvPr id="2" name="Title 1">
+            <a:extLst>
+              <a:ext uri="{FF2B5EF4-FFF2-40B4-BE49-F238E27FC236}">
+                <a16:creationId xmlns:a16="http://schemas.microsoft.com/office/drawing/2014/main" id="{CFC36F48-BA69-AA48-BC70-F918E07B19CD}"/>
+              </a:ext>
+            </a:extLst>
+          </p:cNvPr>
+          <p:cNvSpPr>
+            <a:spLocks noGrp="1"/>
+          </p:cNvSpPr>
+          <p:nvPr>
+            <p:ph type="title"/>
+          </p:nvPr>
+        </p:nvSpPr>
+        <p:spPr/>
+        <p:txBody>
+          <a:bodyPr/>
+          <a:lstStyle/>
+          <a:p>
+            <a:r>
+              <a:rPr lang="en-US" dirty="0"/>
+              <a:t>Example: Estimating with T-Shirt Sizes</a:t>
+            </a:r>
+          </a:p>
+        </p:txBody>
+      </p:sp>
+      <p:sp>
+        <p:nvSpPr>
+          <p:cNvPr id="4" name="Slide Number Placeholder 3">
+            <a:extLst>
+              <a:ext uri="{FF2B5EF4-FFF2-40B4-BE49-F238E27FC236}">
+                <a16:creationId xmlns:a16="http://schemas.microsoft.com/office/drawing/2014/main" id="{8732857F-B530-074E-9ACC-2F02DB3465D7}"/>
+              </a:ext>
+            </a:extLst>
+          </p:cNvPr>
+          <p:cNvSpPr>
+            <a:spLocks noGrp="1"/>
+          </p:cNvSpPr>
+          <p:nvPr>
+            <p:ph type="sldNum" sz="quarter" idx="12"/>
+          </p:nvPr>
+        </p:nvSpPr>
+        <p:spPr/>
+        <p:txBody>
+          <a:bodyPr/>
+          <a:lstStyle/>
+          <a:p>
+            <a:fld id="{20F37917-FD3A-4669-9018-DA04BCDD3D75}" type="slidenum">
+              <a:rPr lang="en-US" smtClean="0"/>
+              <a:t>13</a:t>
+            </a:fld>
+            <a:endParaRPr lang="en-US"/>
+          </a:p>
+        </p:txBody>
+      </p:sp>
+      <p:sp>
+        <p:nvSpPr>
           <p:cNvPr id="8" name="Rectangle 7">
             <a:extLst>
               <a:ext uri="{FF2B5EF4-FFF2-40B4-BE49-F238E27FC236}">
@@ -9550,7 +9550,7 @@
         <p:spPr>
           <a:xfrm>
             <a:off x="419100" y="1452224"/>
-            <a:ext cx="11353800" cy="5519694"/>
+            <a:ext cx="11125200" cy="5408559"/>
           </a:xfrm>
           <a:prstGeom prst="rect">
             <a:avLst/>
@@ -12607,63 +12607,6 @@
           <a:chExt cx="0" cy="0"/>
         </a:xfrm>
       </p:grpSpPr>
-      <p:sp>
-        <p:nvSpPr>
-          <p:cNvPr id="2" name="Title 1">
-            <a:extLst>
-              <a:ext uri="{FF2B5EF4-FFF2-40B4-BE49-F238E27FC236}">
-                <a16:creationId xmlns:a16="http://schemas.microsoft.com/office/drawing/2014/main" id="{F336DFD9-3C00-A649-90C2-995DA0254305}"/>
-              </a:ext>
-            </a:extLst>
-          </p:cNvPr>
-          <p:cNvSpPr>
-            <a:spLocks noGrp="1"/>
-          </p:cNvSpPr>
-          <p:nvPr>
-            <p:ph type="title"/>
-          </p:nvPr>
-        </p:nvSpPr>
-        <p:spPr/>
-        <p:txBody>
-          <a:bodyPr/>
-          <a:lstStyle/>
-          <a:p>
-            <a:r>
-              <a:rPr lang="en-US" dirty="0"/>
-              <a:t>Scrum: Daily progress towards product goals</a:t>
-            </a:r>
-          </a:p>
-        </p:txBody>
-      </p:sp>
-      <p:sp>
-        <p:nvSpPr>
-          <p:cNvPr id="4" name="Slide Number Placeholder 3">
-            <a:extLst>
-              <a:ext uri="{FF2B5EF4-FFF2-40B4-BE49-F238E27FC236}">
-                <a16:creationId xmlns:a16="http://schemas.microsoft.com/office/drawing/2014/main" id="{92282F26-D093-1A46-847A-D076ADE863FD}"/>
-              </a:ext>
-            </a:extLst>
-          </p:cNvPr>
-          <p:cNvSpPr>
-            <a:spLocks noGrp="1"/>
-          </p:cNvSpPr>
-          <p:nvPr>
-            <p:ph type="sldNum" sz="quarter" idx="12"/>
-          </p:nvPr>
-        </p:nvSpPr>
-        <p:spPr/>
-        <p:txBody>
-          <a:bodyPr/>
-          <a:lstStyle/>
-          <a:p>
-            <a:fld id="{20F37917-FD3A-4669-9018-DA04BCDD3D75}" type="slidenum">
-              <a:rPr lang="en-US" smtClean="0"/>
-              <a:t>8</a:t>
-            </a:fld>
-            <a:endParaRPr lang="en-US"/>
-          </a:p>
-        </p:txBody>
-      </p:sp>
       <p:pic>
         <p:nvPicPr>
           <p:cNvPr id="9" name="Picture 8">
@@ -12686,14 +12629,71 @@
         </p:blipFill>
         <p:spPr>
           <a:xfrm>
-            <a:off x="419100" y="1452224"/>
-            <a:ext cx="11353800" cy="5519694"/>
+            <a:off x="584200" y="1226478"/>
+            <a:ext cx="11303000" cy="5494997"/>
           </a:xfrm>
           <a:prstGeom prst="rect">
             <a:avLst/>
           </a:prstGeom>
         </p:spPr>
       </p:pic>
+      <p:sp>
+        <p:nvSpPr>
+          <p:cNvPr id="2" name="Title 1">
+            <a:extLst>
+              <a:ext uri="{FF2B5EF4-FFF2-40B4-BE49-F238E27FC236}">
+                <a16:creationId xmlns:a16="http://schemas.microsoft.com/office/drawing/2014/main" id="{F336DFD9-3C00-A649-90C2-995DA0254305}"/>
+              </a:ext>
+            </a:extLst>
+          </p:cNvPr>
+          <p:cNvSpPr>
+            <a:spLocks noGrp="1"/>
+          </p:cNvSpPr>
+          <p:nvPr>
+            <p:ph type="title"/>
+          </p:nvPr>
+        </p:nvSpPr>
+        <p:spPr/>
+        <p:txBody>
+          <a:bodyPr/>
+          <a:lstStyle/>
+          <a:p>
+            <a:r>
+              <a:rPr lang="en-US" dirty="0"/>
+              <a:t>Scrum: Daily progress towards product goals</a:t>
+            </a:r>
+          </a:p>
+        </p:txBody>
+      </p:sp>
+      <p:sp>
+        <p:nvSpPr>
+          <p:cNvPr id="4" name="Slide Number Placeholder 3">
+            <a:extLst>
+              <a:ext uri="{FF2B5EF4-FFF2-40B4-BE49-F238E27FC236}">
+                <a16:creationId xmlns:a16="http://schemas.microsoft.com/office/drawing/2014/main" id="{92282F26-D093-1A46-847A-D076ADE863FD}"/>
+              </a:ext>
+            </a:extLst>
+          </p:cNvPr>
+          <p:cNvSpPr>
+            <a:spLocks noGrp="1"/>
+          </p:cNvSpPr>
+          <p:nvPr>
+            <p:ph type="sldNum" sz="quarter" idx="12"/>
+          </p:nvPr>
+        </p:nvSpPr>
+        <p:spPr/>
+        <p:txBody>
+          <a:bodyPr/>
+          <a:lstStyle/>
+          <a:p>
+            <a:fld id="{20F37917-FD3A-4669-9018-DA04BCDD3D75}" type="slidenum">
+              <a:rPr lang="en-US" smtClean="0"/>
+              <a:t>8</a:t>
+            </a:fld>
+            <a:endParaRPr lang="en-US"/>
+          </a:p>
+        </p:txBody>
+      </p:sp>
     </p:spTree>
     <p:extLst>
       <p:ext uri="{BB962C8B-B14F-4D97-AF65-F5344CB8AC3E}">

</xml_diff>